<commit_message>
finished leader example in testing tutorial
</commit_message>
<xml_diff>
--- a/doc/examples/testing/leader_fig1.pptx
+++ b/doc/examples/testing/leader_fig1.pptx
@@ -3690,8 +3690,8 @@
         </p:nvSpPr>
         <p:spPr>
           <a:xfrm>
-            <a:off x="3192379" y="1673347"/>
-            <a:ext cx="3938337" cy="3901285"/>
+            <a:off x="2478505" y="1673347"/>
+            <a:ext cx="5317958" cy="3901285"/>
           </a:xfrm>
           <a:prstGeom prst="rect">
             <a:avLst/>

</xml_diff>